<commit_message>
Remove "I wanna play a game" slide
modified:   lab02.pptx
</commit_message>
<xml_diff>
--- a/slides/lab02.pptx
+++ b/slides/lab02.pptx
@@ -5,7 +5,7 @@
     <p:sldMasterId id="2147483660" r:id="rId1"/>
   </p:sldMasterIdLst>
   <p:notesMasterIdLst>
-    <p:notesMasterId r:id="rId15"/>
+    <p:notesMasterId r:id="rId14"/>
   </p:notesMasterIdLst>
   <p:sldIdLst>
     <p:sldId id="256" r:id="rId2"/>
@@ -19,8 +19,7 @@
     <p:sldId id="266" r:id="rId10"/>
     <p:sldId id="265" r:id="rId11"/>
     <p:sldId id="267" r:id="rId12"/>
-    <p:sldId id="268" r:id="rId13"/>
-    <p:sldId id="269" r:id="rId14"/>
+    <p:sldId id="269" r:id="rId13"/>
   </p:sldIdLst>
   <p:sldSz cx="9144000" cy="6858000" type="screen4x3"/>
   <p:notesSz cx="6858000" cy="9144000"/>
@@ -1159,7 +1158,7 @@
           <a:p>
             <a:fld id="{2776758F-3AD9-384A-9C90-C755CDF624A6}" type="slidenum">
               <a:rPr lang="en-US" smtClean="0"/>
-              <a:t>13</a:t>
+              <a:t>12</a:t>
             </a:fld>
             <a:endParaRPr lang="en-US"/>
           </a:p>
@@ -4234,284 +4233,6 @@
 </file>
 
 <file path=ppt/slides/slide12.xml><?xml version="1.0" encoding="utf-8"?>
-<p:sld xmlns:a="http://schemas.openxmlformats.org/drawingml/2006/main" xmlns:r="http://schemas.openxmlformats.org/officeDocument/2006/relationships" xmlns:p="http://schemas.openxmlformats.org/presentationml/2006/main">
-  <p:cSld>
-    <p:spTree>
-      <p:nvGrpSpPr>
-        <p:cNvPr id="1" name=""/>
-        <p:cNvGrpSpPr/>
-        <p:nvPr/>
-      </p:nvGrpSpPr>
-      <p:grpSpPr>
-        <a:xfrm>
-          <a:off x="0" y="0"/>
-          <a:ext cx="0" cy="0"/>
-          <a:chOff x="0" y="0"/>
-          <a:chExt cx="0" cy="0"/>
-        </a:xfrm>
-      </p:grpSpPr>
-      <p:sp>
-        <p:nvSpPr>
-          <p:cNvPr id="9" name="Rectangle 8"/>
-          <p:cNvSpPr>
-            <a:spLocks noGrp="1" noRot="1" noChangeAspect="1" noMove="1" noResize="1" noEditPoints="1" noAdjustHandles="1" noChangeArrowheads="1" noChangeShapeType="1" noTextEdit="1"/>
-          </p:cNvSpPr>
-          <p:nvPr>
-            <p:extLst>
-              <p:ext uri="{386F3935-93C4-4BCD-93E2-E3B085C9AB24}">
-                <p16:designElem xmlns:p16="http://schemas.microsoft.com/office/powerpoint/2015/main" val="1"/>
-              </p:ext>
-            </p:extLst>
-          </p:nvPr>
-        </p:nvSpPr>
-        <p:spPr bwMode="white">
-          <a:xfrm>
-            <a:off x="0" y="0"/>
-            <a:ext cx="9144000" cy="6858000"/>
-          </a:xfrm>
-          <a:prstGeom prst="rect">
-            <a:avLst/>
-          </a:prstGeom>
-          <a:solidFill>
-            <a:schemeClr val="bg1"/>
-          </a:solidFill>
-          <a:ln>
-            <a:noFill/>
-          </a:ln>
-          <a:effectLst/>
-        </p:spPr>
-      </p:sp>
-      <p:pic>
-        <p:nvPicPr>
-          <p:cNvPr id="4" name="Content Placeholder 3"/>
-          <p:cNvPicPr>
-            <a:picLocks noGrp="1" noChangeAspect="1"/>
-          </p:cNvPicPr>
-          <p:nvPr>
-            <p:ph idx="1"/>
-          </p:nvPr>
-        </p:nvPicPr>
-        <p:blipFill>
-          <a:blip r:embed="rId2">
-            <a:extLst>
-              <a:ext uri="{28A0092B-C50C-407E-A947-70E740481C1C}">
-                <a14:useLocalDpi xmlns:a14="http://schemas.microsoft.com/office/drawing/2010/main" val="0"/>
-              </a:ext>
-            </a:extLst>
-          </a:blip>
-          <a:stretch>
-            <a:fillRect/>
-          </a:stretch>
-        </p:blipFill>
-        <p:spPr>
-          <a:xfrm>
-            <a:off x="4624866" y="492573"/>
-            <a:ext cx="3396159" cy="5880796"/>
-          </a:xfrm>
-          <a:prstGeom prst="rect">
-            <a:avLst/>
-          </a:prstGeom>
-        </p:spPr>
-      </p:pic>
-      <p:sp>
-        <p:nvSpPr>
-          <p:cNvPr id="11" name="Rectangle 10"/>
-          <p:cNvSpPr>
-            <a:spLocks noGrp="1" noRot="1" noChangeAspect="1" noMove="1" noResize="1" noEditPoints="1" noAdjustHandles="1" noChangeArrowheads="1" noChangeShapeType="1" noTextEdit="1"/>
-          </p:cNvSpPr>
-          <p:nvPr>
-            <p:extLst>
-              <p:ext uri="{386F3935-93C4-4BCD-93E2-E3B085C9AB24}">
-                <p16:designElem xmlns:p16="http://schemas.microsoft.com/office/powerpoint/2015/main" val="1"/>
-              </p:ext>
-            </p:extLst>
-          </p:nvPr>
-        </p:nvSpPr>
-        <p:spPr bwMode="ltGray">
-          <a:xfrm>
-            <a:off x="252663" y="321177"/>
-            <a:ext cx="3249230" cy="6179552"/>
-          </a:xfrm>
-          <a:prstGeom prst="rect">
-            <a:avLst/>
-          </a:prstGeom>
-          <a:solidFill>
-            <a:schemeClr val="tx1">
-              <a:lumMod val="75000"/>
-              <a:lumOff val="25000"/>
-            </a:schemeClr>
-          </a:solidFill>
-          <a:ln w="127000" cap="sq" cmpd="thinThick">
-            <a:solidFill>
-              <a:schemeClr val="tx1">
-                <a:lumMod val="75000"/>
-                <a:lumOff val="25000"/>
-              </a:schemeClr>
-            </a:solidFill>
-          </a:ln>
-        </p:spPr>
-        <p:style>
-          <a:lnRef idx="2">
-            <a:schemeClr val="accent1">
-              <a:shade val="50000"/>
-            </a:schemeClr>
-          </a:lnRef>
-          <a:fillRef idx="1">
-            <a:schemeClr val="accent1"/>
-          </a:fillRef>
-          <a:effectRef idx="0">
-            <a:schemeClr val="accent1"/>
-          </a:effectRef>
-          <a:fontRef idx="minor">
-            <a:schemeClr val="lt1"/>
-          </a:fontRef>
-        </p:style>
-        <p:txBody>
-          <a:bodyPr rtlCol="0" anchor="ctr"/>
-          <a:lstStyle/>
-          <a:p>
-            <a:pPr algn="ctr"/>
-            <a:endParaRPr lang="en-US"/>
-          </a:p>
-        </p:txBody>
-      </p:sp>
-      <p:cxnSp>
-        <p:nvCxnSpPr>
-          <p:cNvPr id="13" name="Straight Connector 12"/>
-          <p:cNvCxnSpPr>
-            <a:cxnSpLocks noGrp="1" noRot="1" noChangeAspect="1" noMove="1" noResize="1" noEditPoints="1" noAdjustHandles="1" noChangeArrowheads="1" noChangeShapeType="1"/>
-          </p:cNvCxnSpPr>
-          <p:nvPr>
-            <p:extLst>
-              <p:ext uri="{386F3935-93C4-4BCD-93E2-E3B085C9AB24}">
-                <p16:designElem xmlns:p16="http://schemas.microsoft.com/office/powerpoint/2015/main" val="1"/>
-              </p:ext>
-            </p:extLst>
-          </p:nvPr>
-        </p:nvCxnSpPr>
-        <p:spPr>
-          <a:xfrm>
-            <a:off x="893344" y="3910267"/>
-            <a:ext cx="1940093" cy="0"/>
-          </a:xfrm>
-          <a:prstGeom prst="line">
-            <a:avLst/>
-          </a:prstGeom>
-          <a:ln w="22225">
-            <a:solidFill>
-              <a:schemeClr val="bg1">
-                <a:lumMod val="85000"/>
-              </a:schemeClr>
-            </a:solidFill>
-          </a:ln>
-        </p:spPr>
-        <p:style>
-          <a:lnRef idx="1">
-            <a:schemeClr val="accent1"/>
-          </a:lnRef>
-          <a:fillRef idx="0">
-            <a:schemeClr val="accent1"/>
-          </a:fillRef>
-          <a:effectRef idx="0">
-            <a:schemeClr val="accent1"/>
-          </a:effectRef>
-          <a:fontRef idx="minor">
-            <a:schemeClr val="tx1"/>
-          </a:fontRef>
-        </p:style>
-      </p:cxnSp>
-      <p:sp>
-        <p:nvSpPr>
-          <p:cNvPr id="2" name="Title 1"/>
-          <p:cNvSpPr>
-            <a:spLocks noGrp="1"/>
-          </p:cNvSpPr>
-          <p:nvPr>
-            <p:ph type="title"/>
-          </p:nvPr>
-        </p:nvSpPr>
-        <p:spPr>
-          <a:xfrm>
-            <a:off x="505677" y="914400"/>
-            <a:ext cx="2743200" cy="2887579"/>
-          </a:xfrm>
-        </p:spPr>
-        <p:txBody>
-          <a:bodyPr vert="horz" lIns="91440" tIns="45720" rIns="91440" bIns="45720" rtlCol="0" anchor="b">
-            <a:normAutofit/>
-          </a:bodyPr>
-          <a:lstStyle/>
-          <a:p>
-            <a:pPr algn="ctr"/>
-            <a:r>
-              <a:rPr lang="en-US" sz="3900" kern="1200" dirty="0">
-                <a:solidFill>
-                  <a:schemeClr val="bg1"/>
-                </a:solidFill>
-                <a:latin typeface="+mj-lt"/>
-                <a:ea typeface="+mj-ea"/>
-                <a:cs typeface="+mj-cs"/>
-              </a:rPr>
-              <a:t>Let’s </a:t>
-            </a:r>
-            <a:r>
-              <a:rPr lang="en-US" sz="3900" kern="1200" dirty="0" smtClean="0">
-                <a:solidFill>
-                  <a:schemeClr val="bg1"/>
-                </a:solidFill>
-                <a:latin typeface="+mj-lt"/>
-                <a:ea typeface="+mj-ea"/>
-                <a:cs typeface="+mj-cs"/>
-              </a:rPr>
-              <a:t>Make a </a:t>
-            </a:r>
-            <a:r>
-              <a:rPr lang="en-US" sz="3900" kern="1200" dirty="0">
-                <a:solidFill>
-                  <a:schemeClr val="bg1"/>
-                </a:solidFill>
-                <a:latin typeface="+mj-lt"/>
-                <a:ea typeface="+mj-ea"/>
-                <a:cs typeface="+mj-cs"/>
-              </a:rPr>
-              <a:t>Little Game Using </a:t>
-            </a:r>
-            <a:r>
-              <a:rPr lang="en-US" sz="3900" kern="1200" dirty="0" smtClean="0">
-                <a:solidFill>
-                  <a:schemeClr val="bg1"/>
-                </a:solidFill>
-                <a:latin typeface="+mj-lt"/>
-                <a:ea typeface="+mj-ea"/>
-                <a:cs typeface="+mj-cs"/>
-              </a:rPr>
-              <a:t>Pipes</a:t>
-            </a:r>
-            <a:endParaRPr lang="en-US" sz="3900" kern="1200" dirty="0">
-              <a:solidFill>
-                <a:schemeClr val="bg1"/>
-              </a:solidFill>
-              <a:latin typeface="+mj-lt"/>
-              <a:ea typeface="+mj-ea"/>
-              <a:cs typeface="+mj-cs"/>
-            </a:endParaRPr>
-          </a:p>
-        </p:txBody>
-      </p:sp>
-    </p:spTree>
-    <p:extLst>
-      <p:ext uri="{BB962C8B-B14F-4D97-AF65-F5344CB8AC3E}">
-        <p14:creationId xmlns:p14="http://schemas.microsoft.com/office/powerpoint/2010/main" val="1392463360"/>
-      </p:ext>
-    </p:extLst>
-  </p:cSld>
-  <p:clrMapOvr>
-    <a:masterClrMapping/>
-  </p:clrMapOvr>
-</p:sld>
-</file>
-
-<file path=ppt/slides/slide13.xml><?xml version="1.0" encoding="utf-8"?>
 <p:sld xmlns:a="http://schemas.openxmlformats.org/drawingml/2006/main" xmlns:r="http://schemas.openxmlformats.org/officeDocument/2006/relationships" xmlns:p="http://schemas.openxmlformats.org/presentationml/2006/main">
   <p:cSld>
     <p:spTree>

</xml_diff>

<commit_message>
Update the lab 02 slides
modified:   slides/lab02.pptx
</commit_message>
<xml_diff>
--- a/slides/lab02.pptx
+++ b/slides/lab02.pptx
@@ -5,7 +5,7 @@
     <p:sldMasterId id="2147483660" r:id="rId1"/>
   </p:sldMasterIdLst>
   <p:notesMasterIdLst>
-    <p:notesMasterId r:id="rId14"/>
+    <p:notesMasterId r:id="rId15"/>
   </p:notesMasterIdLst>
   <p:sldIdLst>
     <p:sldId id="256" r:id="rId2"/>
@@ -20,6 +20,7 @@
     <p:sldId id="265" r:id="rId11"/>
     <p:sldId id="267" r:id="rId12"/>
     <p:sldId id="269" r:id="rId13"/>
+    <p:sldId id="270" r:id="rId14"/>
   </p:sldIdLst>
   <p:sldSz cx="9144000" cy="6858000" type="screen4x3"/>
   <p:notesSz cx="6858000" cy="9144000"/>
@@ -208,7 +209,7 @@
           <a:p>
             <a:fld id="{0447BC92-E53A-F24D-A51D-7FB076BCC6F1}" type="datetimeFigureOut">
               <a:rPr lang="en-US" smtClean="0"/>
-              <a:t>9/3/17</a:t>
+              <a:t>9/5/17</a:t>
             </a:fld>
             <a:endParaRPr lang="en-US"/>
           </a:p>
@@ -1308,7 +1309,7 @@
           <a:p>
             <a:fld id="{F39D0AC7-9083-8749-AA05-79D3CDD3A717}" type="datetimeFigureOut">
               <a:rPr lang="en-US" smtClean="0"/>
-              <a:t>9/3/17</a:t>
+              <a:t>9/5/17</a:t>
             </a:fld>
             <a:endParaRPr lang="en-US"/>
           </a:p>
@@ -1473,7 +1474,7 @@
           <a:p>
             <a:fld id="{F39D0AC7-9083-8749-AA05-79D3CDD3A717}" type="datetimeFigureOut">
               <a:rPr lang="en-US" smtClean="0"/>
-              <a:t>9/3/17</a:t>
+              <a:t>9/5/17</a:t>
             </a:fld>
             <a:endParaRPr lang="en-US"/>
           </a:p>
@@ -1648,7 +1649,7 @@
           <a:p>
             <a:fld id="{F39D0AC7-9083-8749-AA05-79D3CDD3A717}" type="datetimeFigureOut">
               <a:rPr lang="en-US" smtClean="0"/>
-              <a:t>9/3/17</a:t>
+              <a:t>9/5/17</a:t>
             </a:fld>
             <a:endParaRPr lang="en-US"/>
           </a:p>
@@ -1813,7 +1814,7 @@
           <a:p>
             <a:fld id="{F39D0AC7-9083-8749-AA05-79D3CDD3A717}" type="datetimeFigureOut">
               <a:rPr lang="en-US" smtClean="0"/>
-              <a:t>9/3/17</a:t>
+              <a:t>9/5/17</a:t>
             </a:fld>
             <a:endParaRPr lang="en-US"/>
           </a:p>
@@ -2052,7 +2053,7 @@
           <a:p>
             <a:fld id="{F39D0AC7-9083-8749-AA05-79D3CDD3A717}" type="datetimeFigureOut">
               <a:rPr lang="en-US" smtClean="0"/>
-              <a:t>9/3/17</a:t>
+              <a:t>9/5/17</a:t>
             </a:fld>
             <a:endParaRPr lang="en-US"/>
           </a:p>
@@ -2279,7 +2280,7 @@
           <a:p>
             <a:fld id="{F39D0AC7-9083-8749-AA05-79D3CDD3A717}" type="datetimeFigureOut">
               <a:rPr lang="en-US" smtClean="0"/>
-              <a:t>9/3/17</a:t>
+              <a:t>9/5/17</a:t>
             </a:fld>
             <a:endParaRPr lang="en-US"/>
           </a:p>
@@ -2641,7 +2642,7 @@
           <a:p>
             <a:fld id="{F39D0AC7-9083-8749-AA05-79D3CDD3A717}" type="datetimeFigureOut">
               <a:rPr lang="en-US" smtClean="0"/>
-              <a:t>9/3/17</a:t>
+              <a:t>9/5/17</a:t>
             </a:fld>
             <a:endParaRPr lang="en-US"/>
           </a:p>
@@ -2754,7 +2755,7 @@
           <a:p>
             <a:fld id="{F39D0AC7-9083-8749-AA05-79D3CDD3A717}" type="datetimeFigureOut">
               <a:rPr lang="en-US" smtClean="0"/>
-              <a:t>9/3/17</a:t>
+              <a:t>9/5/17</a:t>
             </a:fld>
             <a:endParaRPr lang="en-US"/>
           </a:p>
@@ -2844,7 +2845,7 @@
           <a:p>
             <a:fld id="{F39D0AC7-9083-8749-AA05-79D3CDD3A717}" type="datetimeFigureOut">
               <a:rPr lang="en-US" smtClean="0"/>
-              <a:t>9/3/17</a:t>
+              <a:t>9/5/17</a:t>
             </a:fld>
             <a:endParaRPr lang="en-US"/>
           </a:p>
@@ -3116,7 +3117,7 @@
           <a:p>
             <a:fld id="{F39D0AC7-9083-8749-AA05-79D3CDD3A717}" type="datetimeFigureOut">
               <a:rPr lang="en-US" smtClean="0"/>
-              <a:t>9/3/17</a:t>
+              <a:t>9/5/17</a:t>
             </a:fld>
             <a:endParaRPr lang="en-US"/>
           </a:p>
@@ -3368,7 +3369,7 @@
           <a:p>
             <a:fld id="{F39D0AC7-9083-8749-AA05-79D3CDD3A717}" type="datetimeFigureOut">
               <a:rPr lang="en-US" smtClean="0"/>
-              <a:t>9/3/17</a:t>
+              <a:t>9/5/17</a:t>
             </a:fld>
             <a:endParaRPr lang="en-US"/>
           </a:p>
@@ -3576,7 +3577,7 @@
           <a:p>
             <a:fld id="{F39D0AC7-9083-8749-AA05-79D3CDD3A717}" type="datetimeFigureOut">
               <a:rPr lang="en-US" smtClean="0"/>
-              <a:t>9/3/17</a:t>
+              <a:t>9/5/17</a:t>
             </a:fld>
             <a:endParaRPr lang="en-US"/>
           </a:p>
@@ -4364,6 +4365,94 @@
     <p:extLst>
       <p:ext uri="{BB962C8B-B14F-4D97-AF65-F5344CB8AC3E}">
         <p14:creationId xmlns:p14="http://schemas.microsoft.com/office/powerpoint/2010/main" val="934980955"/>
+      </p:ext>
+    </p:extLst>
+  </p:cSld>
+  <p:clrMapOvr>
+    <a:masterClrMapping/>
+  </p:clrMapOvr>
+</p:sld>
+</file>
+
+<file path=ppt/slides/slide13.xml><?xml version="1.0" encoding="utf-8"?>
+<p:sld xmlns:a="http://schemas.openxmlformats.org/drawingml/2006/main" xmlns:r="http://schemas.openxmlformats.org/officeDocument/2006/relationships" xmlns:p="http://schemas.openxmlformats.org/presentationml/2006/main">
+  <p:cSld>
+    <p:spTree>
+      <p:nvGrpSpPr>
+        <p:cNvPr id="1" name=""/>
+        <p:cNvGrpSpPr/>
+        <p:nvPr/>
+      </p:nvGrpSpPr>
+      <p:grpSpPr>
+        <a:xfrm>
+          <a:off x="0" y="0"/>
+          <a:ext cx="0" cy="0"/>
+          <a:chOff x="0" y="0"/>
+          <a:chExt cx="0" cy="0"/>
+        </a:xfrm>
+      </p:grpSpPr>
+      <p:sp>
+        <p:nvSpPr>
+          <p:cNvPr id="2" name="Title 1"/>
+          <p:cNvSpPr>
+            <a:spLocks noGrp="1"/>
+          </p:cNvSpPr>
+          <p:nvPr>
+            <p:ph type="title"/>
+          </p:nvPr>
+        </p:nvSpPr>
+        <p:spPr/>
+        <p:txBody>
+          <a:bodyPr/>
+          <a:lstStyle/>
+          <a:p>
+            <a:r>
+              <a:rPr lang="en-US" dirty="0" smtClean="0"/>
+              <a:t>Function Pointer Example</a:t>
+            </a:r>
+            <a:endParaRPr lang="en-US" dirty="0"/>
+          </a:p>
+        </p:txBody>
+      </p:sp>
+      <p:sp>
+        <p:nvSpPr>
+          <p:cNvPr id="3" name="Content Placeholder 2"/>
+          <p:cNvSpPr>
+            <a:spLocks noGrp="1"/>
+          </p:cNvSpPr>
+          <p:nvPr>
+            <p:ph idx="1"/>
+          </p:nvPr>
+        </p:nvSpPr>
+        <p:spPr/>
+        <p:txBody>
+          <a:bodyPr/>
+          <a:lstStyle/>
+          <a:p>
+            <a:r>
+              <a:rPr lang="en-US" dirty="0"/>
+              <a:t>https://</a:t>
+            </a:r>
+            <a:r>
+              <a:rPr lang="en-US" dirty="0" err="1" smtClean="0"/>
+              <a:t>oscourse.github.io</a:t>
+            </a:r>
+            <a:r>
+              <a:rPr lang="en-US" dirty="0" smtClean="0"/>
+              <a:t>/examples/</a:t>
+            </a:r>
+            <a:r>
+              <a:rPr lang="en-US" dirty="0" err="1" smtClean="0"/>
+              <a:t>function_pointer_example.c</a:t>
+            </a:r>
+            <a:endParaRPr lang="en-US" dirty="0"/>
+          </a:p>
+        </p:txBody>
+      </p:sp>
+    </p:spTree>
+    <p:extLst>
+      <p:ext uri="{BB962C8B-B14F-4D97-AF65-F5344CB8AC3E}">
+        <p14:creationId xmlns:p14="http://schemas.microsoft.com/office/powerpoint/2010/main" val="505150487"/>
       </p:ext>
     </p:extLst>
   </p:cSld>

</xml_diff>